<commit_message>
updates after con call
git-svn-id: http://gforge.hl7.org/svn/fhir/trunk@1744 2f0db536-2c49-4257-a3fa-e771ed206c19
</commit_message>
<xml_diff>
--- a/connectathons/Boston2013/Introduction.pptx
+++ b/connectathons/Boston2013/Introduction.pptx
@@ -7,11 +7,13 @@
   <p:sldIdLst>
     <p:sldId id="256" r:id="rId2"/>
     <p:sldId id="257" r:id="rId3"/>
-    <p:sldId id="259" r:id="rId4"/>
-    <p:sldId id="261" r:id="rId5"/>
-    <p:sldId id="258" r:id="rId6"/>
-    <p:sldId id="260" r:id="rId7"/>
-    <p:sldId id="262" r:id="rId8"/>
+    <p:sldId id="263" r:id="rId4"/>
+    <p:sldId id="259" r:id="rId5"/>
+    <p:sldId id="261" r:id="rId6"/>
+    <p:sldId id="258" r:id="rId7"/>
+    <p:sldId id="260" r:id="rId8"/>
+    <p:sldId id="262" r:id="rId9"/>
+    <p:sldId id="264" r:id="rId10"/>
   </p:sldIdLst>
   <p:sldSz cx="9144000" cy="6858000" type="screen4x3"/>
   <p:notesSz cx="6858000" cy="9144000"/>
@@ -294,7 +296,7 @@
           <a:p>
             <a:fld id="{205646F1-7183-3D41-8191-B4174FF3FDF4}" type="datetimeFigureOut">
               <a:rPr lang="en-US" smtClean="0"/>
-              <a:t>16/09/13</a:t>
+              <a:t>19/09/13</a:t>
             </a:fld>
             <a:endParaRPr lang="en-US"/>
           </a:p>
@@ -464,7 +466,7 @@
           <a:p>
             <a:fld id="{205646F1-7183-3D41-8191-B4174FF3FDF4}" type="datetimeFigureOut">
               <a:rPr lang="en-US" smtClean="0"/>
-              <a:t>16/09/13</a:t>
+              <a:t>19/09/13</a:t>
             </a:fld>
             <a:endParaRPr lang="en-US"/>
           </a:p>
@@ -644,7 +646,7 @@
           <a:p>
             <a:fld id="{205646F1-7183-3D41-8191-B4174FF3FDF4}" type="datetimeFigureOut">
               <a:rPr lang="en-US" smtClean="0"/>
-              <a:t>16/09/13</a:t>
+              <a:t>19/09/13</a:t>
             </a:fld>
             <a:endParaRPr lang="en-US"/>
           </a:p>
@@ -814,7 +816,7 @@
           <a:p>
             <a:fld id="{205646F1-7183-3D41-8191-B4174FF3FDF4}" type="datetimeFigureOut">
               <a:rPr lang="en-US" smtClean="0"/>
-              <a:t>16/09/13</a:t>
+              <a:t>19/09/13</a:t>
             </a:fld>
             <a:endParaRPr lang="en-US"/>
           </a:p>
@@ -1060,7 +1062,7 @@
           <a:p>
             <a:fld id="{205646F1-7183-3D41-8191-B4174FF3FDF4}" type="datetimeFigureOut">
               <a:rPr lang="en-US" smtClean="0"/>
-              <a:t>16/09/13</a:t>
+              <a:t>19/09/13</a:t>
             </a:fld>
             <a:endParaRPr lang="en-US"/>
           </a:p>
@@ -1348,7 +1350,7 @@
           <a:p>
             <a:fld id="{205646F1-7183-3D41-8191-B4174FF3FDF4}" type="datetimeFigureOut">
               <a:rPr lang="en-US" smtClean="0"/>
-              <a:t>16/09/13</a:t>
+              <a:t>19/09/13</a:t>
             </a:fld>
             <a:endParaRPr lang="en-US"/>
           </a:p>
@@ -1770,7 +1772,7 @@
           <a:p>
             <a:fld id="{205646F1-7183-3D41-8191-B4174FF3FDF4}" type="datetimeFigureOut">
               <a:rPr lang="en-US" smtClean="0"/>
-              <a:t>16/09/13</a:t>
+              <a:t>19/09/13</a:t>
             </a:fld>
             <a:endParaRPr lang="en-US"/>
           </a:p>
@@ -1888,7 +1890,7 @@
           <a:p>
             <a:fld id="{205646F1-7183-3D41-8191-B4174FF3FDF4}" type="datetimeFigureOut">
               <a:rPr lang="en-US" smtClean="0"/>
-              <a:t>16/09/13</a:t>
+              <a:t>19/09/13</a:t>
             </a:fld>
             <a:endParaRPr lang="en-US"/>
           </a:p>
@@ -1983,7 +1985,7 @@
           <a:p>
             <a:fld id="{205646F1-7183-3D41-8191-B4174FF3FDF4}" type="datetimeFigureOut">
               <a:rPr lang="en-US" smtClean="0"/>
-              <a:t>16/09/13</a:t>
+              <a:t>19/09/13</a:t>
             </a:fld>
             <a:endParaRPr lang="en-US"/>
           </a:p>
@@ -2260,7 +2262,7 @@
           <a:p>
             <a:fld id="{205646F1-7183-3D41-8191-B4174FF3FDF4}" type="datetimeFigureOut">
               <a:rPr lang="en-US" smtClean="0"/>
-              <a:t>16/09/13</a:t>
+              <a:t>19/09/13</a:t>
             </a:fld>
             <a:endParaRPr lang="en-US"/>
           </a:p>
@@ -2513,7 +2515,7 @@
           <a:p>
             <a:fld id="{205646F1-7183-3D41-8191-B4174FF3FDF4}" type="datetimeFigureOut">
               <a:rPr lang="en-US" smtClean="0"/>
-              <a:t>16/09/13</a:t>
+              <a:t>19/09/13</a:t>
             </a:fld>
             <a:endParaRPr lang="en-US"/>
           </a:p>
@@ -2609,7 +2611,7 @@
         <p:spPr>
           <a:xfrm>
             <a:off x="457200" y="274638"/>
-            <a:ext cx="8229600" cy="1143000"/>
+            <a:ext cx="6836229" cy="1143000"/>
           </a:xfrm>
           <a:prstGeom prst="rect">
             <a:avLst/>
@@ -2726,7 +2728,7 @@
           <a:p>
             <a:fld id="{205646F1-7183-3D41-8191-B4174FF3FDF4}" type="datetimeFigureOut">
               <a:rPr lang="en-US" smtClean="0"/>
-              <a:t>16/09/13</a:t>
+              <a:t>19/09/13</a:t>
             </a:fld>
             <a:endParaRPr lang="en-US"/>
           </a:p>
@@ -2810,6 +2812,67 @@
           </a:p>
         </p:txBody>
       </p:sp>
+      <p:pic>
+        <p:nvPicPr>
+          <p:cNvPr id="8" name="Picture 7" descr="icon-fhir-720.png"/>
+          <p:cNvPicPr>
+            <a:picLocks noChangeAspect="1"/>
+          </p:cNvPicPr>
+          <p:nvPr userDrawn="1"/>
+        </p:nvPicPr>
+        <p:blipFill>
+          <a:blip r:embed="rId13">
+            <a:alphaModFix amt="28000"/>
+            <a:extLst>
+              <a:ext uri="{28A0092B-C50C-407E-A947-70E740481C1C}">
+                <a14:useLocalDpi xmlns:a14="http://schemas.microsoft.com/office/drawing/2010/main" val="0"/>
+              </a:ext>
+            </a:extLst>
+          </a:blip>
+          <a:stretch>
+            <a:fillRect/>
+          </a:stretch>
+        </p:blipFill>
+        <p:spPr>
+          <a:xfrm>
+            <a:off x="2282371" y="1243389"/>
+            <a:ext cx="4805438" cy="4805438"/>
+          </a:xfrm>
+          <a:prstGeom prst="rect">
+            <a:avLst/>
+          </a:prstGeom>
+        </p:spPr>
+      </p:pic>
+      <p:pic>
+        <p:nvPicPr>
+          <p:cNvPr id="9" name="Picture 8" descr="HL7logo.gif"/>
+          <p:cNvPicPr>
+            <a:picLocks noChangeAspect="1"/>
+          </p:cNvPicPr>
+          <p:nvPr userDrawn="1"/>
+        </p:nvPicPr>
+        <p:blipFill>
+          <a:blip r:embed="rId14">
+            <a:extLst>
+              <a:ext uri="{28A0092B-C50C-407E-A947-70E740481C1C}">
+                <a14:useLocalDpi xmlns:a14="http://schemas.microsoft.com/office/drawing/2010/main" val="0"/>
+              </a:ext>
+            </a:extLst>
+          </a:blip>
+          <a:stretch>
+            <a:fillRect/>
+          </a:stretch>
+        </p:blipFill>
+        <p:spPr>
+          <a:xfrm>
+            <a:off x="7607300" y="317500"/>
+            <a:ext cx="1079500" cy="1282700"/>
+          </a:xfrm>
+          <a:prstGeom prst="rect">
+            <a:avLst/>
+          </a:prstGeom>
+        </p:spPr>
+      </p:pic>
     </p:spTree>
     <p:extLst>
       <p:ext uri="{BB962C8B-B14F-4D97-AF65-F5344CB8AC3E}">
@@ -3334,6 +3397,163 @@
           <a:p>
             <a:r>
               <a:rPr lang="en-US" dirty="0" smtClean="0"/>
+              <a:t>Purpose of Connectathon</a:t>
+            </a:r>
+            <a:endParaRPr lang="en-US" dirty="0"/>
+          </a:p>
+        </p:txBody>
+      </p:sp>
+      <p:sp>
+        <p:nvSpPr>
+          <p:cNvPr id="3" name="Content Placeholder 2"/>
+          <p:cNvSpPr>
+            <a:spLocks noGrp="1"/>
+          </p:cNvSpPr>
+          <p:nvPr>
+            <p:ph idx="1"/>
+          </p:nvPr>
+        </p:nvSpPr>
+        <p:spPr/>
+        <p:txBody>
+          <a:bodyPr>
+            <a:normAutofit fontScale="92500" lnSpcReduction="10000"/>
+          </a:bodyPr>
+          <a:lstStyle/>
+          <a:p>
+            <a:r>
+              <a:rPr lang="en-US" dirty="0" smtClean="0"/>
+              <a:t>Testing</a:t>
+            </a:r>
+          </a:p>
+          <a:p>
+            <a:r>
+              <a:rPr lang="en-US" dirty="0" smtClean="0"/>
+              <a:t>Ballot</a:t>
+            </a:r>
+          </a:p>
+          <a:p>
+            <a:pPr lvl="1"/>
+            <a:r>
+              <a:rPr lang="en-US" dirty="0" smtClean="0"/>
+              <a:t>Last chance to collect ballot topics</a:t>
+            </a:r>
+          </a:p>
+          <a:p>
+            <a:pPr lvl="1"/>
+            <a:r>
+              <a:rPr lang="en-US" dirty="0" smtClean="0"/>
+              <a:t>Send to Grahame / Lloyd</a:t>
+            </a:r>
+          </a:p>
+          <a:p>
+            <a:r>
+              <a:rPr lang="en-US" dirty="0" smtClean="0"/>
+              <a:t>Hot topics</a:t>
+            </a:r>
+          </a:p>
+          <a:p>
+            <a:pPr lvl="1"/>
+            <a:r>
+              <a:rPr lang="en-US" dirty="0" smtClean="0"/>
+              <a:t>Get list now (at end of this presentation)</a:t>
+            </a:r>
+          </a:p>
+          <a:p>
+            <a:pPr lvl="2"/>
+            <a:r>
+              <a:rPr lang="en-US" dirty="0" smtClean="0"/>
+              <a:t>?add to </a:t>
+            </a:r>
+            <a:r>
+              <a:rPr lang="en-US" dirty="0" err="1" smtClean="0"/>
+              <a:t>google</a:t>
+            </a:r>
+            <a:r>
+              <a:rPr lang="en-US" dirty="0" smtClean="0"/>
+              <a:t> doc</a:t>
+            </a:r>
+          </a:p>
+          <a:p>
+            <a:pPr lvl="1"/>
+            <a:r>
+              <a:rPr lang="en-US" dirty="0" smtClean="0"/>
+              <a:t>When to schedule</a:t>
+            </a:r>
+          </a:p>
+          <a:p>
+            <a:pPr lvl="2"/>
+            <a:r>
+              <a:rPr lang="en-US" dirty="0" smtClean="0"/>
+              <a:t>Spread out over day</a:t>
+            </a:r>
+          </a:p>
+          <a:p>
+            <a:pPr lvl="1"/>
+            <a:r>
+              <a:rPr lang="en-US" dirty="0" smtClean="0"/>
+              <a:t>Use </a:t>
+            </a:r>
+            <a:r>
+              <a:rPr lang="en-US" dirty="0" err="1" smtClean="0"/>
+              <a:t>skype</a:t>
+            </a:r>
+            <a:r>
+              <a:rPr lang="en-US" dirty="0" smtClean="0"/>
+              <a:t> to co-ordinate </a:t>
+            </a:r>
+          </a:p>
+          <a:p>
+            <a:endParaRPr lang="en-US" dirty="0"/>
+          </a:p>
+        </p:txBody>
+      </p:sp>
+    </p:spTree>
+    <p:extLst>
+      <p:ext uri="{BB962C8B-B14F-4D97-AF65-F5344CB8AC3E}">
+        <p14:creationId xmlns:p14="http://schemas.microsoft.com/office/powerpoint/2010/main" val="1944616777"/>
+      </p:ext>
+    </p:extLst>
+  </p:cSld>
+  <p:clrMapOvr>
+    <a:masterClrMapping/>
+  </p:clrMapOvr>
+</p:sld>
+</file>
+
+<file path=ppt/slides/slide4.xml><?xml version="1.0" encoding="utf-8"?>
+<p:sld xmlns:a="http://schemas.openxmlformats.org/drawingml/2006/main" xmlns:r="http://schemas.openxmlformats.org/officeDocument/2006/relationships" xmlns:p="http://schemas.openxmlformats.org/presentationml/2006/main">
+  <p:cSld>
+    <p:spTree>
+      <p:nvGrpSpPr>
+        <p:cNvPr id="1" name=""/>
+        <p:cNvGrpSpPr/>
+        <p:nvPr/>
+      </p:nvGrpSpPr>
+      <p:grpSpPr>
+        <a:xfrm>
+          <a:off x="0" y="0"/>
+          <a:ext cx="0" cy="0"/>
+          <a:chOff x="0" y="0"/>
+          <a:chExt cx="0" cy="0"/>
+        </a:xfrm>
+      </p:grpSpPr>
+      <p:sp>
+        <p:nvSpPr>
+          <p:cNvPr id="2" name="Title 1"/>
+          <p:cNvSpPr>
+            <a:spLocks noGrp="1"/>
+          </p:cNvSpPr>
+          <p:nvPr>
+            <p:ph type="title"/>
+          </p:nvPr>
+        </p:nvSpPr>
+        <p:spPr/>
+        <p:txBody>
+          <a:bodyPr/>
+          <a:lstStyle/>
+          <a:p>
+            <a:r>
+              <a:rPr lang="en-US" dirty="0" smtClean="0"/>
               <a:t>Plan for the Meeting</a:t>
             </a:r>
             <a:endParaRPr lang="en-US" dirty="0"/>
@@ -3424,7 +3644,7 @@
 </p:sld>
 </file>
 
-<file path=ppt/slides/slide4.xml><?xml version="1.0" encoding="utf-8"?>
+<file path=ppt/slides/slide5.xml><?xml version="1.0" encoding="utf-8"?>
 <p:sld xmlns:a="http://schemas.openxmlformats.org/drawingml/2006/main" xmlns:r="http://schemas.openxmlformats.org/officeDocument/2006/relationships" xmlns:p="http://schemas.openxmlformats.org/presentationml/2006/main">
   <p:cSld>
     <p:spTree>
@@ -3481,7 +3701,15 @@
           <a:p>
             <a:r>
               <a:rPr lang="en-US" dirty="0" smtClean="0"/>
-              <a:t>There will be a wiki page () that summarizes key info</a:t>
+              <a:t>There </a:t>
+            </a:r>
+            <a:r>
+              <a:rPr lang="en-US" dirty="0" smtClean="0"/>
+              <a:t>is a Google Document(</a:t>
+            </a:r>
+            <a:r>
+              <a:rPr lang="en-US" dirty="0" smtClean="0"/>
+              <a:t>) that summarizes key info</a:t>
             </a:r>
           </a:p>
           <a:p>
@@ -3502,8 +3730,9 @@
             <a:pPr lvl="1"/>
             <a:r>
               <a:rPr lang="en-US" dirty="0" smtClean="0"/>
-              <a:t>We’ll build this up from info you provide</a:t>
-            </a:r>
+              <a:t>Can update directly or send us the info</a:t>
+            </a:r>
+            <a:endParaRPr lang="en-US" dirty="0" smtClean="0"/>
           </a:p>
           <a:p>
             <a:r>
@@ -3542,7 +3771,7 @@
 </p:sld>
 </file>
 
-<file path=ppt/slides/slide5.xml><?xml version="1.0" encoding="utf-8"?>
+<file path=ppt/slides/slide6.xml><?xml version="1.0" encoding="utf-8"?>
 <p:sld xmlns:a="http://schemas.openxmlformats.org/drawingml/2006/main" xmlns:r="http://schemas.openxmlformats.org/officeDocument/2006/relationships" xmlns:p="http://schemas.openxmlformats.org/presentationml/2006/main">
   <p:cSld>
     <p:spTree>
@@ -3665,152 +3894,6 @@
 </p:sld>
 </file>
 
-<file path=ppt/slides/slide6.xml><?xml version="1.0" encoding="utf-8"?>
-<p:sld xmlns:a="http://schemas.openxmlformats.org/drawingml/2006/main" xmlns:r="http://schemas.openxmlformats.org/officeDocument/2006/relationships" xmlns:p="http://schemas.openxmlformats.org/presentationml/2006/main">
-  <p:cSld>
-    <p:spTree>
-      <p:nvGrpSpPr>
-        <p:cNvPr id="1" name=""/>
-        <p:cNvGrpSpPr/>
-        <p:nvPr/>
-      </p:nvGrpSpPr>
-      <p:grpSpPr>
-        <a:xfrm>
-          <a:off x="0" y="0"/>
-          <a:ext cx="0" cy="0"/>
-          <a:chOff x="0" y="0"/>
-          <a:chExt cx="0" cy="0"/>
-        </a:xfrm>
-      </p:grpSpPr>
-      <p:sp>
-        <p:nvSpPr>
-          <p:cNvPr id="2" name="Title 1"/>
-          <p:cNvSpPr>
-            <a:spLocks noGrp="1"/>
-          </p:cNvSpPr>
-          <p:nvPr>
-            <p:ph type="title"/>
-          </p:nvPr>
-        </p:nvSpPr>
-        <p:spPr/>
-        <p:txBody>
-          <a:bodyPr/>
-          <a:lstStyle/>
-          <a:p>
-            <a:r>
-              <a:rPr lang="en-US" dirty="0" smtClean="0"/>
-              <a:t>Introductions</a:t>
-            </a:r>
-            <a:endParaRPr lang="en-US" dirty="0"/>
-          </a:p>
-        </p:txBody>
-      </p:sp>
-      <p:sp>
-        <p:nvSpPr>
-          <p:cNvPr id="3" name="Content Placeholder 2"/>
-          <p:cNvSpPr>
-            <a:spLocks noGrp="1"/>
-          </p:cNvSpPr>
-          <p:nvPr>
-            <p:ph idx="1"/>
-          </p:nvPr>
-        </p:nvSpPr>
-        <p:spPr/>
-        <p:txBody>
-          <a:bodyPr>
-            <a:normAutofit fontScale="92500" lnSpcReduction="20000"/>
-          </a:bodyPr>
-          <a:lstStyle/>
-          <a:p>
-            <a:r>
-              <a:rPr lang="en-US" dirty="0" smtClean="0"/>
-              <a:t>Please introduce yourself and your company</a:t>
-            </a:r>
-          </a:p>
-          <a:p>
-            <a:r>
-              <a:rPr lang="en-US" dirty="0" smtClean="0"/>
-              <a:t>Please keep it brief -  a minute max</a:t>
-            </a:r>
-          </a:p>
-          <a:p>
-            <a:pPr lvl="1"/>
-            <a:r>
-              <a:rPr lang="en-US" dirty="0" smtClean="0"/>
-              <a:t>There are lots of us </a:t>
-            </a:r>
-          </a:p>
-          <a:p>
-            <a:r>
-              <a:rPr lang="en-US" dirty="0" smtClean="0"/>
-              <a:t>Please indicate:</a:t>
-            </a:r>
-          </a:p>
-          <a:p>
-            <a:pPr lvl="1"/>
-            <a:r>
-              <a:rPr lang="en-US" dirty="0" smtClean="0"/>
-              <a:t>Which scenarios you will be exercising / developing</a:t>
-            </a:r>
-          </a:p>
-          <a:p>
-            <a:pPr lvl="2"/>
-            <a:r>
-              <a:rPr lang="en-US" dirty="0" smtClean="0"/>
-              <a:t>Server/client</a:t>
-            </a:r>
-          </a:p>
-          <a:p>
-            <a:pPr lvl="2"/>
-            <a:r>
-              <a:rPr lang="en-US" dirty="0" smtClean="0"/>
-              <a:t>XML/JSON/Both</a:t>
-            </a:r>
-          </a:p>
-          <a:p>
-            <a:pPr lvl="1"/>
-            <a:r>
-              <a:rPr lang="en-US" dirty="0" smtClean="0"/>
-              <a:t>Which scenarios you will be testing</a:t>
-            </a:r>
-          </a:p>
-          <a:p>
-            <a:pPr lvl="2"/>
-            <a:r>
-              <a:rPr lang="en-US" dirty="0" smtClean="0"/>
-              <a:t>As above</a:t>
-            </a:r>
-          </a:p>
-          <a:p>
-            <a:r>
-              <a:rPr lang="en-US" dirty="0" smtClean="0"/>
-              <a:t>Please make sure you complete the registration sheet </a:t>
-            </a:r>
-            <a:r>
-              <a:rPr lang="en-US" dirty="0" err="1" smtClean="0"/>
-              <a:t>asap</a:t>
-            </a:r>
-            <a:r>
-              <a:rPr lang="en-US" dirty="0" smtClean="0"/>
-              <a:t> as we’ll use that for the wiki</a:t>
-            </a:r>
-            <a:endParaRPr lang="en-US" dirty="0"/>
-          </a:p>
-        </p:txBody>
-      </p:sp>
-    </p:spTree>
-    <p:extLst>
-      <p:ext uri="{BB962C8B-B14F-4D97-AF65-F5344CB8AC3E}">
-        <p14:creationId xmlns:p14="http://schemas.microsoft.com/office/powerpoint/2010/main" val="2858469113"/>
-      </p:ext>
-    </p:extLst>
-  </p:cSld>
-  <p:clrMapOvr>
-    <a:masterClrMapping/>
-  </p:clrMapOvr>
-</p:sld>
-</file>
-
 <file path=ppt/slides/slide7.xml><?xml version="1.0" encoding="utf-8"?>
 <p:sld xmlns:a="http://schemas.openxmlformats.org/drawingml/2006/main" xmlns:r="http://schemas.openxmlformats.org/officeDocument/2006/relationships" xmlns:p="http://schemas.openxmlformats.org/presentationml/2006/main">
   <p:cSld>
@@ -3845,6 +3928,152 @@
           <a:p>
             <a:r>
               <a:rPr lang="en-US" dirty="0" smtClean="0"/>
+              <a:t>Introductions</a:t>
+            </a:r>
+            <a:endParaRPr lang="en-US" dirty="0"/>
+          </a:p>
+        </p:txBody>
+      </p:sp>
+      <p:sp>
+        <p:nvSpPr>
+          <p:cNvPr id="3" name="Content Placeholder 2"/>
+          <p:cNvSpPr>
+            <a:spLocks noGrp="1"/>
+          </p:cNvSpPr>
+          <p:nvPr>
+            <p:ph idx="1"/>
+          </p:nvPr>
+        </p:nvSpPr>
+        <p:spPr/>
+        <p:txBody>
+          <a:bodyPr>
+            <a:normAutofit fontScale="92500" lnSpcReduction="20000"/>
+          </a:bodyPr>
+          <a:lstStyle/>
+          <a:p>
+            <a:r>
+              <a:rPr lang="en-US" dirty="0" smtClean="0"/>
+              <a:t>Please introduce yourself and your company</a:t>
+            </a:r>
+          </a:p>
+          <a:p>
+            <a:r>
+              <a:rPr lang="en-US" dirty="0" smtClean="0"/>
+              <a:t>Please keep it brief -  a minute max</a:t>
+            </a:r>
+          </a:p>
+          <a:p>
+            <a:pPr lvl="1"/>
+            <a:r>
+              <a:rPr lang="en-US" dirty="0" smtClean="0"/>
+              <a:t>There are lots of us </a:t>
+            </a:r>
+          </a:p>
+          <a:p>
+            <a:r>
+              <a:rPr lang="en-US" dirty="0" smtClean="0"/>
+              <a:t>Please indicate:</a:t>
+            </a:r>
+          </a:p>
+          <a:p>
+            <a:pPr lvl="1"/>
+            <a:r>
+              <a:rPr lang="en-US" dirty="0" smtClean="0"/>
+              <a:t>Which scenarios you will be exercising / developing</a:t>
+            </a:r>
+          </a:p>
+          <a:p>
+            <a:pPr lvl="2"/>
+            <a:r>
+              <a:rPr lang="en-US" dirty="0" smtClean="0"/>
+              <a:t>Server/client</a:t>
+            </a:r>
+          </a:p>
+          <a:p>
+            <a:pPr lvl="2"/>
+            <a:r>
+              <a:rPr lang="en-US" dirty="0" smtClean="0"/>
+              <a:t>XML/JSON/Both</a:t>
+            </a:r>
+          </a:p>
+          <a:p>
+            <a:pPr lvl="1"/>
+            <a:r>
+              <a:rPr lang="en-US" dirty="0" smtClean="0"/>
+              <a:t>Which scenarios you will be testing</a:t>
+            </a:r>
+          </a:p>
+          <a:p>
+            <a:pPr lvl="2"/>
+            <a:r>
+              <a:rPr lang="en-US" dirty="0" smtClean="0"/>
+              <a:t>As above</a:t>
+            </a:r>
+          </a:p>
+          <a:p>
+            <a:r>
+              <a:rPr lang="en-US" dirty="0" smtClean="0"/>
+              <a:t>Please make sure you complete the registration sheet </a:t>
+            </a:r>
+            <a:r>
+              <a:rPr lang="en-US" dirty="0" err="1" smtClean="0"/>
+              <a:t>asap</a:t>
+            </a:r>
+            <a:r>
+              <a:rPr lang="en-US" dirty="0" smtClean="0"/>
+              <a:t> as we’ll use that for the wiki</a:t>
+            </a:r>
+            <a:endParaRPr lang="en-US" dirty="0"/>
+          </a:p>
+        </p:txBody>
+      </p:sp>
+    </p:spTree>
+    <p:extLst>
+      <p:ext uri="{BB962C8B-B14F-4D97-AF65-F5344CB8AC3E}">
+        <p14:creationId xmlns:p14="http://schemas.microsoft.com/office/powerpoint/2010/main" val="2858469113"/>
+      </p:ext>
+    </p:extLst>
+  </p:cSld>
+  <p:clrMapOvr>
+    <a:masterClrMapping/>
+  </p:clrMapOvr>
+</p:sld>
+</file>
+
+<file path=ppt/slides/slide8.xml><?xml version="1.0" encoding="utf-8"?>
+<p:sld xmlns:a="http://schemas.openxmlformats.org/drawingml/2006/main" xmlns:r="http://schemas.openxmlformats.org/officeDocument/2006/relationships" xmlns:p="http://schemas.openxmlformats.org/presentationml/2006/main">
+  <p:cSld>
+    <p:spTree>
+      <p:nvGrpSpPr>
+        <p:cNvPr id="1" name=""/>
+        <p:cNvGrpSpPr/>
+        <p:nvPr/>
+      </p:nvGrpSpPr>
+      <p:grpSpPr>
+        <a:xfrm>
+          <a:off x="0" y="0"/>
+          <a:ext cx="0" cy="0"/>
+          <a:chOff x="0" y="0"/>
+          <a:chExt cx="0" cy="0"/>
+        </a:xfrm>
+      </p:grpSpPr>
+      <p:sp>
+        <p:nvSpPr>
+          <p:cNvPr id="2" name="Title 1"/>
+          <p:cNvSpPr>
+            <a:spLocks noGrp="1"/>
+          </p:cNvSpPr>
+          <p:nvPr>
+            <p:ph type="title"/>
+          </p:nvPr>
+        </p:nvSpPr>
+        <p:spPr/>
+        <p:txBody>
+          <a:bodyPr/>
+          <a:lstStyle/>
+          <a:p>
+            <a:r>
+              <a:rPr lang="en-US" dirty="0" smtClean="0"/>
               <a:t>Questions / Comments?</a:t>
             </a:r>
             <a:endParaRPr lang="en-US" dirty="0"/>
@@ -3874,6 +4103,144 @@
     <p:extLst>
       <p:ext uri="{BB962C8B-B14F-4D97-AF65-F5344CB8AC3E}">
         <p14:creationId xmlns:p14="http://schemas.microsoft.com/office/powerpoint/2010/main" val="1291783963"/>
+      </p:ext>
+    </p:extLst>
+  </p:cSld>
+  <p:clrMapOvr>
+    <a:masterClrMapping/>
+  </p:clrMapOvr>
+</p:sld>
+</file>
+
+<file path=ppt/slides/slide9.xml><?xml version="1.0" encoding="utf-8"?>
+<p:sld xmlns:a="http://schemas.openxmlformats.org/drawingml/2006/main" xmlns:r="http://schemas.openxmlformats.org/officeDocument/2006/relationships" xmlns:p="http://schemas.openxmlformats.org/presentationml/2006/main">
+  <p:cSld>
+    <p:spTree>
+      <p:nvGrpSpPr>
+        <p:cNvPr id="1" name=""/>
+        <p:cNvGrpSpPr/>
+        <p:nvPr/>
+      </p:nvGrpSpPr>
+      <p:grpSpPr>
+        <a:xfrm>
+          <a:off x="0" y="0"/>
+          <a:ext cx="0" cy="0"/>
+          <a:chOff x="0" y="0"/>
+          <a:chExt cx="0" cy="0"/>
+        </a:xfrm>
+      </p:grpSpPr>
+      <p:sp>
+        <p:nvSpPr>
+          <p:cNvPr id="2" name="Title 1"/>
+          <p:cNvSpPr>
+            <a:spLocks noGrp="1"/>
+          </p:cNvSpPr>
+          <p:nvPr>
+            <p:ph type="title"/>
+          </p:nvPr>
+        </p:nvSpPr>
+        <p:spPr/>
+        <p:txBody>
+          <a:bodyPr/>
+          <a:lstStyle/>
+          <a:p>
+            <a:r>
+              <a:rPr lang="en-US" dirty="0" smtClean="0"/>
+              <a:t>List of hot topics</a:t>
+            </a:r>
+            <a:endParaRPr lang="en-US" dirty="0"/>
+          </a:p>
+        </p:txBody>
+      </p:sp>
+      <p:graphicFrame>
+        <p:nvGraphicFramePr>
+          <p:cNvPr id="4" name="Content Placeholder 3"/>
+          <p:cNvGraphicFramePr>
+            <a:graphicFrameLocks noGrp="1"/>
+          </p:cNvGraphicFramePr>
+          <p:nvPr>
+            <p:ph idx="1"/>
+            <p:extLst>
+              <p:ext uri="{D42A27DB-BD31-4B8C-83A1-F6EECF244321}">
+                <p14:modId xmlns:p14="http://schemas.microsoft.com/office/powerpoint/2010/main" val="286809031"/>
+              </p:ext>
+            </p:extLst>
+          </p:nvPr>
+        </p:nvGraphicFramePr>
+        <p:xfrm>
+          <a:off x="457200" y="1600200"/>
+          <a:ext cx="8229600" cy="741680"/>
+        </p:xfrm>
+        <a:graphic>
+          <a:graphicData uri="http://schemas.openxmlformats.org/drawingml/2006/table">
+            <a:tbl>
+              <a:tblPr firstRow="1" bandRow="1">
+                <a:tableStyleId>{5C22544A-7EE6-4342-B048-85BDC9FD1C3A}</a:tableStyleId>
+              </a:tblPr>
+              <a:tblGrid>
+                <a:gridCol w="5389669"/>
+                <a:gridCol w="2839931"/>
+              </a:tblGrid>
+              <a:tr h="370840">
+                <a:tc>
+                  <a:txBody>
+                    <a:bodyPr/>
+                    <a:lstStyle/>
+                    <a:p>
+                      <a:r>
+                        <a:rPr lang="en-US" dirty="0" smtClean="0"/>
+                        <a:t>Topic</a:t>
+                      </a:r>
+                      <a:endParaRPr lang="en-US" dirty="0"/>
+                    </a:p>
+                  </a:txBody>
+                  <a:tcPr/>
+                </a:tc>
+                <a:tc>
+                  <a:txBody>
+                    <a:bodyPr/>
+                    <a:lstStyle/>
+                    <a:p>
+                      <a:r>
+                        <a:rPr lang="en-US" dirty="0" smtClean="0"/>
+                        <a:t>When</a:t>
+                      </a:r>
+                      <a:endParaRPr lang="en-US" dirty="0"/>
+                    </a:p>
+                  </a:txBody>
+                  <a:tcPr/>
+                </a:tc>
+              </a:tr>
+              <a:tr h="370840">
+                <a:tc>
+                  <a:txBody>
+                    <a:bodyPr/>
+                    <a:lstStyle/>
+                    <a:p>
+                      <a:endParaRPr lang="en-US"/>
+                    </a:p>
+                  </a:txBody>
+                  <a:tcPr/>
+                </a:tc>
+                <a:tc>
+                  <a:txBody>
+                    <a:bodyPr/>
+                    <a:lstStyle/>
+                    <a:p>
+                      <a:endParaRPr lang="en-US" dirty="0"/>
+                    </a:p>
+                  </a:txBody>
+                  <a:tcPr/>
+                </a:tc>
+              </a:tr>
+            </a:tbl>
+          </a:graphicData>
+        </a:graphic>
+      </p:graphicFrame>
+    </p:spTree>
+    <p:extLst>
+      <p:ext uri="{BB962C8B-B14F-4D97-AF65-F5344CB8AC3E}">
+        <p14:creationId xmlns:p14="http://schemas.microsoft.com/office/powerpoint/2010/main" val="679819838"/>
       </p:ext>
     </p:extLst>
   </p:cSld>

</xml_diff>